<commit_message>
fixed a mistake with unary+ operator in class vector (3d) in lectures 11 and 12
</commit_message>
<xml_diff>
--- a/lectures/lecture #12 presentation.pptx
+++ b/lectures/lecture #12 presentation.pptx
@@ -209,7 +209,7 @@
           <a:p>
             <a:fld id="{9F16E362-832A-824E-B063-25F5DE831740}" type="datetimeFigureOut">
               <a:rPr lang="en-RU" smtClean="0"/>
-              <a:t>07.01.2022</a:t>
+              <a:t>09.01.2022</a:t>
             </a:fld>
             <a:endParaRPr lang="en-RU"/>
           </a:p>
@@ -6961,7 +6961,7 @@
         <p:spPr>
           <a:xfrm>
             <a:off x="1120775" y="1975295"/>
-            <a:ext cx="4677212" cy="2979763"/>
+            <a:ext cx="4890570" cy="3115689"/>
           </a:xfrm>
           <a:prstGeom prst="rect">
             <a:avLst/>
@@ -6970,10 +6970,10 @@
       </p:pic>
       <p:pic>
         <p:nvPicPr>
-          <p:cNvPr id="10" name="Picture 9">
+          <p:cNvPr id="4" name="Picture 3">
             <a:extLst>
               <a:ext uri="{FF2B5EF4-FFF2-40B4-BE49-F238E27FC236}">
-                <a16:creationId xmlns:a16="http://schemas.microsoft.com/office/drawing/2014/main" id="{48A5408F-CD1D-EA4A-B82A-6ED28DC131E7}"/>
+                <a16:creationId xmlns:a16="http://schemas.microsoft.com/office/drawing/2014/main" id="{74A3F7D5-3EA2-294D-A9A9-263287C3E0DF}"/>
               </a:ext>
             </a:extLst>
           </p:cNvPr>
@@ -6996,8 +6996,8 @@
         </p:blipFill>
         <p:spPr>
           <a:xfrm>
-            <a:off x="6096000" y="1969118"/>
-            <a:ext cx="5386679" cy="3799381"/>
+            <a:off x="6180655" y="1975296"/>
+            <a:ext cx="4890570" cy="3434707"/>
           </a:xfrm>
           <a:prstGeom prst="rect">
             <a:avLst/>

</xml_diff>